<commit_message>
Added testing part to PPT
</commit_message>
<xml_diff>
--- a/Bootcamp_2013_Javascript.pptx
+++ b/Bootcamp_2013_Javascript.pptx
@@ -5,10 +5,10 @@
     <p:sldMasterId id="2147483648" r:id="rId4"/>
   </p:sldMasterIdLst>
   <p:notesMasterIdLst>
-    <p:notesMasterId r:id="rId22"/>
+    <p:notesMasterId r:id="rId24"/>
   </p:notesMasterIdLst>
   <p:handoutMasterIdLst>
-    <p:handoutMasterId r:id="rId23"/>
+    <p:handoutMasterId r:id="rId25"/>
   </p:handoutMasterIdLst>
   <p:sldIdLst>
     <p:sldId id="256" r:id="rId5"/>
@@ -27,7 +27,9 @@
     <p:sldId id="272" r:id="rId18"/>
     <p:sldId id="273" r:id="rId19"/>
     <p:sldId id="274" r:id="rId20"/>
-    <p:sldId id="275" r:id="rId21"/>
+    <p:sldId id="280" r:id="rId21"/>
+    <p:sldId id="281" r:id="rId22"/>
+    <p:sldId id="275" r:id="rId23"/>
   </p:sldIdLst>
   <p:sldSz cx="9144000" cy="6858000" type="screen4x3"/>
   <p:notesSz cx="6858000" cy="9144000"/>
@@ -128,7 +130,7 @@
   </p:defaultTextStyle>
   <p:extLst>
     <p:ext uri="{EFAFB233-063F-42B5-8137-9DF3F51BA10A}">
-      <p15:sldGuideLst xmlns:p15="http://schemas.microsoft.com/office/powerpoint/2012/main" xmlns="">
+      <p15:sldGuideLst xmlns:p15="http://schemas.microsoft.com/office/powerpoint/2012/main">
         <p15:guide id="1" orient="horz" pos="2160">
           <p15:clr>
             <a:srgbClr val="A4A3A4"/>
@@ -142,7 +144,7 @@
       </p15:sldGuideLst>
     </p:ext>
     <p:ext uri="{2D200454-40CA-4A62-9FC3-DE9A4176ACB9}">
-      <p15:notesGuideLst xmlns:p15="http://schemas.microsoft.com/office/powerpoint/2012/main" xmlns="">
+      <p15:notesGuideLst xmlns:p15="http://schemas.microsoft.com/office/powerpoint/2012/main">
         <p15:guide id="1" orient="horz" pos="2880">
           <p15:clr>
             <a:srgbClr val="A4A3A4"/>
@@ -242,7 +244,7 @@
             <a:fld id="{EE6C105D-2CF9-41DB-85FD-D66740423677}" type="datetimeFigureOut">
               <a:rPr lang="nl-BE" smtClean="0"/>
               <a:pPr/>
-              <a:t>27/05/2013</a:t>
+              <a:t>2/06/2013</a:t>
             </a:fld>
             <a:endParaRPr lang="nl-BE"/>
           </a:p>
@@ -318,7 +320,7 @@
     </p:spTree>
     <p:extLst>
       <p:ext uri="{BB962C8B-B14F-4D97-AF65-F5344CB8AC3E}">
-        <p14:creationId xmlns:p14="http://schemas.microsoft.com/office/powerpoint/2010/main" xmlns="" val="3153120616"/>
+        <p14:creationId xmlns:p14="http://schemas.microsoft.com/office/powerpoint/2010/main" val="3153120616"/>
       </p:ext>
     </p:extLst>
   </p:cSld>
@@ -409,7 +411,7 @@
             <a:fld id="{EB0EBD4C-DAF9-4E72-A1A4-1160C8AA0ED9}" type="datetimeFigureOut">
               <a:rPr lang="nl-BE" smtClean="0"/>
               <a:pPr/>
-              <a:t>27/05/2013</a:t>
+              <a:t>2/06/2013</a:t>
             </a:fld>
             <a:endParaRPr lang="nl-BE"/>
           </a:p>
@@ -580,7 +582,7 @@
     </p:spTree>
     <p:extLst>
       <p:ext uri="{BB962C8B-B14F-4D97-AF65-F5344CB8AC3E}">
-        <p14:creationId xmlns:p14="http://schemas.microsoft.com/office/powerpoint/2010/main" xmlns="" val="3581364128"/>
+        <p14:creationId xmlns:p14="http://schemas.microsoft.com/office/powerpoint/2010/main" val="3581364128"/>
       </p:ext>
     </p:extLst>
   </p:cSld>
@@ -755,7 +757,7 @@
     </p:spTree>
     <p:extLst>
       <p:ext uri="{BB962C8B-B14F-4D97-AF65-F5344CB8AC3E}">
-        <p14:creationId xmlns:p14="http://schemas.microsoft.com/office/powerpoint/2010/main" xmlns="" val="3350252289"/>
+        <p14:creationId xmlns:p14="http://schemas.microsoft.com/office/powerpoint/2010/main" val="3350252289"/>
       </p:ext>
     </p:extLst>
   </p:cSld>
@@ -854,7 +856,7 @@
     </p:spTree>
     <p:extLst>
       <p:ext uri="{BB962C8B-B14F-4D97-AF65-F5344CB8AC3E}">
-        <p14:creationId xmlns:p14="http://schemas.microsoft.com/office/powerpoint/2010/main" xmlns="" val="318376778"/>
+        <p14:creationId xmlns:p14="http://schemas.microsoft.com/office/powerpoint/2010/main" val="318376778"/>
       </p:ext>
     </p:extLst>
   </p:cSld>
@@ -978,7 +980,7 @@
     </p:spTree>
     <p:extLst>
       <p:ext uri="{BB962C8B-B14F-4D97-AF65-F5344CB8AC3E}">
-        <p14:creationId xmlns:p14="http://schemas.microsoft.com/office/powerpoint/2010/main" xmlns="" val="887362603"/>
+        <p14:creationId xmlns:p14="http://schemas.microsoft.com/office/powerpoint/2010/main" val="887362603"/>
       </p:ext>
     </p:extLst>
   </p:cSld>
@@ -1079,7 +1081,7 @@
     </p:spTree>
     <p:extLst>
       <p:ext uri="{BB962C8B-B14F-4D97-AF65-F5344CB8AC3E}">
-        <p14:creationId xmlns:p14="http://schemas.microsoft.com/office/powerpoint/2010/main" xmlns="" val="2888998979"/>
+        <p14:creationId xmlns:p14="http://schemas.microsoft.com/office/powerpoint/2010/main" val="2888998979"/>
       </p:ext>
     </p:extLst>
   </p:cSld>
@@ -1172,7 +1174,7 @@
     </p:spTree>
     <p:extLst>
       <p:ext uri="{BB962C8B-B14F-4D97-AF65-F5344CB8AC3E}">
-        <p14:creationId xmlns:p14="http://schemas.microsoft.com/office/powerpoint/2010/main" xmlns="" val="281400538"/>
+        <p14:creationId xmlns:p14="http://schemas.microsoft.com/office/powerpoint/2010/main" val="281400538"/>
       </p:ext>
     </p:extLst>
   </p:cSld>
@@ -1478,7 +1480,7 @@
           <a:blip r:embed="rId2" cstate="print">
             <a:extLst>
               <a:ext uri="{28A0092B-C50C-407E-A947-70E740481C1C}">
-                <a14:useLocalDpi xmlns:a14="http://schemas.microsoft.com/office/drawing/2010/main" xmlns="" val="0"/>
+                <a14:useLocalDpi xmlns:a14="http://schemas.microsoft.com/office/drawing/2010/main" val="0"/>
               </a:ext>
             </a:extLst>
           </a:blip>
@@ -1498,7 +1500,7 @@
           <a:noFill/>
           <a:extLst>
             <a:ext uri="{909E8E84-426E-40DD-AFC4-6F175D3DCCD1}">
-              <a14:hiddenFill xmlns:a14="http://schemas.microsoft.com/office/drawing/2010/main" xmlns="">
+              <a14:hiddenFill xmlns:a14="http://schemas.microsoft.com/office/drawing/2010/main">
                 <a:solidFill>
                   <a:srgbClr val="FFFFFF"/>
                 </a:solidFill>
@@ -1971,7 +1973,7 @@
     </p:spTree>
     <p:extLst>
       <p:ext uri="{BB962C8B-B14F-4D97-AF65-F5344CB8AC3E}">
-        <p14:creationId xmlns:p14="http://schemas.microsoft.com/office/powerpoint/2010/main" xmlns="" val="32359562"/>
+        <p14:creationId xmlns:p14="http://schemas.microsoft.com/office/powerpoint/2010/main" val="32359562"/>
       </p:ext>
     </p:extLst>
   </p:cSld>
@@ -2272,7 +2274,7 @@
           <a:blip r:embed="rId2" cstate="print">
             <a:extLst>
               <a:ext uri="{28A0092B-C50C-407E-A947-70E740481C1C}">
-                <a14:useLocalDpi xmlns:a14="http://schemas.microsoft.com/office/drawing/2010/main" xmlns="" val="0"/>
+                <a14:useLocalDpi xmlns:a14="http://schemas.microsoft.com/office/drawing/2010/main" val="0"/>
               </a:ext>
             </a:extLst>
           </a:blip>
@@ -2292,7 +2294,7 @@
           <a:noFill/>
           <a:extLst>
             <a:ext uri="{909E8E84-426E-40DD-AFC4-6F175D3DCCD1}">
-              <a14:hiddenFill xmlns:a14="http://schemas.microsoft.com/office/drawing/2010/main" xmlns="">
+              <a14:hiddenFill xmlns:a14="http://schemas.microsoft.com/office/drawing/2010/main">
                 <a:solidFill>
                   <a:srgbClr val="FFFFFF"/>
                 </a:solidFill>
@@ -2521,7 +2523,7 @@
           <a:blip r:embed="rId2" cstate="print">
             <a:extLst>
               <a:ext uri="{28A0092B-C50C-407E-A947-70E740481C1C}">
-                <a14:useLocalDpi xmlns:a14="http://schemas.microsoft.com/office/drawing/2010/main" xmlns="" val="0"/>
+                <a14:useLocalDpi xmlns:a14="http://schemas.microsoft.com/office/drawing/2010/main" val="0"/>
               </a:ext>
             </a:extLst>
           </a:blip>
@@ -2545,14 +2547,14 @@
           <a:effectLst/>
           <a:extLst>
             <a:ext uri="{909E8E84-426E-40DD-AFC4-6F175D3DCCD1}">
-              <a14:hiddenFill xmlns:a14="http://schemas.microsoft.com/office/drawing/2010/main" xmlns="">
+              <a14:hiddenFill xmlns:a14="http://schemas.microsoft.com/office/drawing/2010/main">
                 <a:solidFill>
                   <a:schemeClr val="accent1"/>
                 </a:solidFill>
               </a14:hiddenFill>
             </a:ext>
             <a:ext uri="{91240B29-F687-4F45-9708-019B960494DF}">
-              <a14:hiddenLine xmlns:a14="http://schemas.microsoft.com/office/drawing/2010/main" xmlns="" w="9525">
+              <a14:hiddenLine xmlns:a14="http://schemas.microsoft.com/office/drawing/2010/main" w="9525">
                 <a:solidFill>
                   <a:schemeClr val="tx1"/>
                 </a:solidFill>
@@ -2562,7 +2564,7 @@
               </a14:hiddenLine>
             </a:ext>
             <a:ext uri="{AF507438-7753-43E0-B8FC-AC1667EBCBE1}">
-              <a14:hiddenEffects xmlns:a14="http://schemas.microsoft.com/office/drawing/2010/main" xmlns="">
+              <a14:hiddenEffects xmlns:a14="http://schemas.microsoft.com/office/drawing/2010/main">
                 <a:effectLst>
                   <a:outerShdw dist="35921" dir="2700000" algn="ctr" rotWithShape="0">
                     <a:schemeClr val="bg2"/>
@@ -2656,7 +2658,7 @@
     </p:spTree>
     <p:extLst>
       <p:ext uri="{BB962C8B-B14F-4D97-AF65-F5344CB8AC3E}">
-        <p14:creationId xmlns:p14="http://schemas.microsoft.com/office/powerpoint/2010/main" xmlns="" val="3167805242"/>
+        <p14:creationId xmlns:p14="http://schemas.microsoft.com/office/powerpoint/2010/main" val="3167805242"/>
       </p:ext>
     </p:extLst>
   </p:cSld>
@@ -2782,7 +2784,7 @@
           <a:blip r:embed="rId2" cstate="print">
             <a:extLst>
               <a:ext uri="{28A0092B-C50C-407E-A947-70E740481C1C}">
-                <a14:useLocalDpi xmlns:a14="http://schemas.microsoft.com/office/drawing/2010/main" xmlns="" val="0"/>
+                <a14:useLocalDpi xmlns:a14="http://schemas.microsoft.com/office/drawing/2010/main" val="0"/>
               </a:ext>
             </a:extLst>
           </a:blip>
@@ -2802,7 +2804,7 @@
           <a:noFill/>
           <a:extLst>
             <a:ext uri="{909E8E84-426E-40DD-AFC4-6F175D3DCCD1}">
-              <a14:hiddenFill xmlns:a14="http://schemas.microsoft.com/office/drawing/2010/main" xmlns="">
+              <a14:hiddenFill xmlns:a14="http://schemas.microsoft.com/office/drawing/2010/main">
                 <a:solidFill>
                   <a:srgbClr val="FFFFFF"/>
                 </a:solidFill>
@@ -2814,7 +2816,7 @@
     </p:spTree>
     <p:extLst>
       <p:ext uri="{BB962C8B-B14F-4D97-AF65-F5344CB8AC3E}">
-        <p14:creationId xmlns:p14="http://schemas.microsoft.com/office/powerpoint/2010/main" xmlns="" val="1934964490"/>
+        <p14:creationId xmlns:p14="http://schemas.microsoft.com/office/powerpoint/2010/main" val="1934964490"/>
       </p:ext>
     </p:extLst>
   </p:cSld>
@@ -3246,7 +3248,7 @@
     </p:spTree>
     <p:extLst>
       <p:ext uri="{BB962C8B-B14F-4D97-AF65-F5344CB8AC3E}">
-        <p14:creationId xmlns:p14="http://schemas.microsoft.com/office/powerpoint/2010/main" xmlns="" val="161331180"/>
+        <p14:creationId xmlns:p14="http://schemas.microsoft.com/office/powerpoint/2010/main" val="161331180"/>
       </p:ext>
     </p:extLst>
   </p:cSld>
@@ -3392,7 +3394,7 @@
           <a:blip r:embed="rId10" cstate="print">
             <a:extLst>
               <a:ext uri="{28A0092B-C50C-407E-A947-70E740481C1C}">
-                <a14:useLocalDpi xmlns:a14="http://schemas.microsoft.com/office/drawing/2010/main" xmlns="" val="0"/>
+                <a14:useLocalDpi xmlns:a14="http://schemas.microsoft.com/office/drawing/2010/main" val="0"/>
               </a:ext>
             </a:extLst>
           </a:blip>
@@ -3412,7 +3414,7 @@
           <a:noFill/>
           <a:extLst>
             <a:ext uri="{909E8E84-426E-40DD-AFC4-6F175D3DCCD1}">
-              <a14:hiddenFill xmlns:a14="http://schemas.microsoft.com/office/drawing/2010/main" xmlns="">
+              <a14:hiddenFill xmlns:a14="http://schemas.microsoft.com/office/drawing/2010/main">
                 <a:solidFill>
                   <a:srgbClr val="FFFFFF"/>
                 </a:solidFill>
@@ -3762,7 +3764,7 @@
     </p:spTree>
     <p:extLst>
       <p:ext uri="{BB962C8B-B14F-4D97-AF65-F5344CB8AC3E}">
-        <p14:creationId xmlns:p14="http://schemas.microsoft.com/office/powerpoint/2010/main" xmlns="" val="2171318384"/>
+        <p14:creationId xmlns:p14="http://schemas.microsoft.com/office/powerpoint/2010/main" val="2171318384"/>
       </p:ext>
     </p:extLst>
   </p:cSld>
@@ -3926,7 +3928,7 @@
     </p:spTree>
     <p:extLst>
       <p:ext uri="{BB962C8B-B14F-4D97-AF65-F5344CB8AC3E}">
-        <p14:creationId xmlns:p14="http://schemas.microsoft.com/office/powerpoint/2010/main" xmlns="" val="4157722389"/>
+        <p14:creationId xmlns:p14="http://schemas.microsoft.com/office/powerpoint/2010/main" val="4157722389"/>
       </p:ext>
     </p:extLst>
   </p:cSld>
@@ -5199,7 +5201,7 @@
     </p:spTree>
     <p:extLst>
       <p:ext uri="{BB962C8B-B14F-4D97-AF65-F5344CB8AC3E}">
-        <p14:creationId xmlns:p14="http://schemas.microsoft.com/office/powerpoint/2010/main" xmlns="" val="1150581003"/>
+        <p14:creationId xmlns:p14="http://schemas.microsoft.com/office/powerpoint/2010/main" val="1150581003"/>
       </p:ext>
     </p:extLst>
   </p:cSld>
@@ -6145,7 +6147,7 @@
     </p:spTree>
     <p:extLst>
       <p:ext uri="{BB962C8B-B14F-4D97-AF65-F5344CB8AC3E}">
-        <p14:creationId xmlns:p14="http://schemas.microsoft.com/office/powerpoint/2010/main" xmlns="" val="1502351786"/>
+        <p14:creationId xmlns:p14="http://schemas.microsoft.com/office/powerpoint/2010/main" val="1502351786"/>
       </p:ext>
     </p:extLst>
   </p:cSld>
@@ -6688,7 +6690,7 @@
     </p:spTree>
     <p:extLst>
       <p:ext uri="{BB962C8B-B14F-4D97-AF65-F5344CB8AC3E}">
-        <p14:creationId xmlns:p14="http://schemas.microsoft.com/office/powerpoint/2010/main" xmlns="" val="140361558"/>
+        <p14:creationId xmlns:p14="http://schemas.microsoft.com/office/powerpoint/2010/main" val="140361558"/>
       </p:ext>
     </p:extLst>
   </p:cSld>
@@ -7634,7 +7636,7 @@
     </p:spTree>
     <p:extLst>
       <p:ext uri="{BB962C8B-B14F-4D97-AF65-F5344CB8AC3E}">
-        <p14:creationId xmlns:p14="http://schemas.microsoft.com/office/powerpoint/2010/main" xmlns="" val="2887598583"/>
+        <p14:creationId xmlns:p14="http://schemas.microsoft.com/office/powerpoint/2010/main" val="2887598583"/>
       </p:ext>
     </p:extLst>
   </p:cSld>
@@ -8357,7 +8359,7 @@
     </p:spTree>
     <p:extLst>
       <p:ext uri="{BB962C8B-B14F-4D97-AF65-F5344CB8AC3E}">
-        <p14:creationId xmlns:p14="http://schemas.microsoft.com/office/powerpoint/2010/main" xmlns="" val="2641290698"/>
+        <p14:creationId xmlns:p14="http://schemas.microsoft.com/office/powerpoint/2010/main" val="2641290698"/>
       </p:ext>
     </p:extLst>
   </p:cSld>
@@ -8408,11 +8410,7 @@
           <a:p>
             <a:r>
               <a:rPr lang="en-US" dirty="0" smtClean="0"/>
-              <a:t>Testing: Jasmine &amp; </a:t>
-            </a:r>
-            <a:r>
-              <a:rPr lang="en-US" dirty="0" err="1" smtClean="0"/>
-              <a:t>PhantomJs</a:t>
+              <a:t>Testing JavaScript</a:t>
             </a:r>
             <a:endParaRPr lang="nl-BE" dirty="0"/>
           </a:p>
@@ -8440,7 +8438,7 @@
     </p:spTree>
     <p:extLst>
       <p:ext uri="{BB962C8B-B14F-4D97-AF65-F5344CB8AC3E}">
-        <p14:creationId xmlns:p14="http://schemas.microsoft.com/office/powerpoint/2010/main" xmlns="" val="1458169294"/>
+        <p14:creationId xmlns:p14="http://schemas.microsoft.com/office/powerpoint/2010/main" val="1458169294"/>
       </p:ext>
     </p:extLst>
   </p:cSld>
@@ -8491,6 +8489,1325 @@
           <a:p>
             <a:r>
               <a:rPr lang="en-US" dirty="0" smtClean="0"/>
+              <a:t>Testing JavaScript</a:t>
+            </a:r>
+            <a:endParaRPr lang="nl-BE" dirty="0"/>
+          </a:p>
+        </p:txBody>
+      </p:sp>
+      <p:pic>
+        <p:nvPicPr>
+          <p:cNvPr id="7" name="Picture 2" descr="http://www.outsideinview.com/wp-content/uploads/2012/12/why3.jpg"/>
+          <p:cNvPicPr>
+            <a:picLocks noChangeAspect="1" noChangeArrowheads="1"/>
+          </p:cNvPicPr>
+          <p:nvPr/>
+        </p:nvPicPr>
+        <p:blipFill>
+          <a:blip r:embed="rId2" cstate="print">
+            <a:clrChange>
+              <a:clrFrom>
+                <a:srgbClr val="FFFFFF"/>
+              </a:clrFrom>
+              <a:clrTo>
+                <a:srgbClr val="FFFFFF">
+                  <a:alpha val="0"/>
+                </a:srgbClr>
+              </a:clrTo>
+            </a:clrChange>
+            <a:extLst>
+              <a:ext uri="{28A0092B-C50C-407E-A947-70E740481C1C}">
+                <a14:useLocalDpi xmlns:a14="http://schemas.microsoft.com/office/drawing/2010/main" val="0"/>
+              </a:ext>
+            </a:extLst>
+          </a:blip>
+          <a:srcRect/>
+          <a:stretch>
+            <a:fillRect/>
+          </a:stretch>
+        </p:blipFill>
+        <p:spPr bwMode="auto">
+          <a:xfrm>
+            <a:off x="1447801" y="838200"/>
+            <a:ext cx="5562600" cy="6256807"/>
+          </a:xfrm>
+          <a:prstGeom prst="rect">
+            <a:avLst/>
+          </a:prstGeom>
+          <a:noFill/>
+          <a:extLst>
+            <a:ext uri="{909E8E84-426E-40DD-AFC4-6F175D3DCCD1}">
+              <a14:hiddenFill xmlns:a14="http://schemas.microsoft.com/office/drawing/2010/main">
+                <a:solidFill>
+                  <a:srgbClr val="FFFFFF"/>
+                </a:solidFill>
+              </a14:hiddenFill>
+            </a:ext>
+          </a:extLst>
+        </p:spPr>
+      </p:pic>
+      <p:sp>
+        <p:nvSpPr>
+          <p:cNvPr id="3" name="Folded Corner 2"/>
+          <p:cNvSpPr/>
+          <p:nvPr/>
+        </p:nvSpPr>
+        <p:spPr>
+          <a:xfrm rot="1241733">
+            <a:off x="6771232" y="470410"/>
+            <a:ext cx="1685666" cy="1248587"/>
+          </a:xfrm>
+          <a:prstGeom prst="foldedCorner">
+            <a:avLst/>
+          </a:prstGeom>
+        </p:spPr>
+        <p:style>
+          <a:lnRef idx="1">
+            <a:schemeClr val="accent5"/>
+          </a:lnRef>
+          <a:fillRef idx="2">
+            <a:schemeClr val="accent5"/>
+          </a:fillRef>
+          <a:effectRef idx="1">
+            <a:schemeClr val="accent5"/>
+          </a:effectRef>
+          <a:fontRef idx="minor">
+            <a:schemeClr val="dk1"/>
+          </a:fontRef>
+        </p:style>
+        <p:txBody>
+          <a:bodyPr rtlCol="0" anchor="ctr"/>
+          <a:lstStyle/>
+          <a:p>
+            <a:pPr algn="ctr"/>
+            <a:r>
+              <a:rPr lang="nl-BE" b="1" dirty="0" smtClean="0">
+                <a:latin typeface="Buxton Sketch" panose="03080500000500000004" pitchFamily="66" charset="0"/>
+              </a:rPr>
+              <a:t>I </a:t>
+            </a:r>
+            <a:r>
+              <a:rPr lang="nl-BE" b="1" dirty="0" err="1" smtClean="0">
+                <a:latin typeface="Buxton Sketch" panose="03080500000500000004" pitchFamily="66" charset="0"/>
+              </a:rPr>
+              <a:t>find</a:t>
+            </a:r>
+            <a:r>
+              <a:rPr lang="nl-BE" b="1" dirty="0" smtClean="0">
+                <a:latin typeface="Buxton Sketch" panose="03080500000500000004" pitchFamily="66" charset="0"/>
+              </a:rPr>
+              <a:t> </a:t>
+            </a:r>
+            <a:r>
+              <a:rPr lang="nl-BE" b="1" dirty="0" err="1" smtClean="0">
+                <a:latin typeface="Buxton Sketch" panose="03080500000500000004" pitchFamily="66" charset="0"/>
+              </a:rPr>
+              <a:t>this</a:t>
+            </a:r>
+            <a:r>
+              <a:rPr lang="nl-BE" b="1" dirty="0" smtClean="0">
+                <a:latin typeface="Buxton Sketch" panose="03080500000500000004" pitchFamily="66" charset="0"/>
+              </a:rPr>
+              <a:t> hard </a:t>
+            </a:r>
+            <a:r>
+              <a:rPr lang="nl-BE" b="1" dirty="0" err="1" smtClean="0">
+                <a:latin typeface="Buxton Sketch" panose="03080500000500000004" pitchFamily="66" charset="0"/>
+              </a:rPr>
+              <a:t>to</a:t>
+            </a:r>
+            <a:r>
+              <a:rPr lang="nl-BE" b="1" dirty="0" smtClean="0">
+                <a:latin typeface="Buxton Sketch" panose="03080500000500000004" pitchFamily="66" charset="0"/>
+              </a:rPr>
+              <a:t> do</a:t>
+            </a:r>
+            <a:endParaRPr lang="nl-BE" b="1" dirty="0">
+              <a:latin typeface="Buxton Sketch" panose="03080500000500000004" pitchFamily="66" charset="0"/>
+            </a:endParaRPr>
+          </a:p>
+        </p:txBody>
+      </p:sp>
+      <p:sp>
+        <p:nvSpPr>
+          <p:cNvPr id="8" name="Folded Corner 7"/>
+          <p:cNvSpPr/>
+          <p:nvPr/>
+        </p:nvSpPr>
+        <p:spPr>
+          <a:xfrm rot="20132892">
+            <a:off x="402553" y="1300422"/>
+            <a:ext cx="1707558" cy="1099759"/>
+          </a:xfrm>
+          <a:prstGeom prst="foldedCorner">
+            <a:avLst/>
+          </a:prstGeom>
+        </p:spPr>
+        <p:style>
+          <a:lnRef idx="1">
+            <a:schemeClr val="accent5"/>
+          </a:lnRef>
+          <a:fillRef idx="2">
+            <a:schemeClr val="accent5"/>
+          </a:fillRef>
+          <a:effectRef idx="1">
+            <a:schemeClr val="accent5"/>
+          </a:effectRef>
+          <a:fontRef idx="minor">
+            <a:schemeClr val="dk1"/>
+          </a:fontRef>
+        </p:style>
+        <p:txBody>
+          <a:bodyPr rtlCol="0" anchor="ctr"/>
+          <a:lstStyle/>
+          <a:p>
+            <a:pPr algn="ctr"/>
+            <a:r>
+              <a:rPr lang="nl-BE" b="1" dirty="0" smtClean="0">
+                <a:latin typeface="Buxton Sketch" panose="03080500000500000004" pitchFamily="66" charset="0"/>
+              </a:rPr>
+              <a:t>I </a:t>
+            </a:r>
+            <a:r>
+              <a:rPr lang="nl-BE" b="1" dirty="0" err="1" smtClean="0">
+                <a:latin typeface="Buxton Sketch" panose="03080500000500000004" pitchFamily="66" charset="0"/>
+              </a:rPr>
+              <a:t>don’t</a:t>
+            </a:r>
+            <a:r>
+              <a:rPr lang="nl-BE" b="1" dirty="0" smtClean="0">
+                <a:latin typeface="Buxton Sketch" panose="03080500000500000004" pitchFamily="66" charset="0"/>
+              </a:rPr>
+              <a:t> </a:t>
+            </a:r>
+            <a:r>
+              <a:rPr lang="nl-BE" b="1" dirty="0" err="1" smtClean="0">
+                <a:latin typeface="Buxton Sketch" panose="03080500000500000004" pitchFamily="66" charset="0"/>
+              </a:rPr>
+              <a:t>know</a:t>
+            </a:r>
+            <a:r>
+              <a:rPr lang="nl-BE" b="1" dirty="0" smtClean="0">
+                <a:latin typeface="Buxton Sketch" panose="03080500000500000004" pitchFamily="66" charset="0"/>
+              </a:rPr>
+              <a:t> </a:t>
+            </a:r>
+            <a:r>
+              <a:rPr lang="nl-BE" b="1" dirty="0" err="1" smtClean="0">
+                <a:latin typeface="Buxton Sketch" panose="03080500000500000004" pitchFamily="66" charset="0"/>
+              </a:rPr>
+              <a:t>where</a:t>
+            </a:r>
+            <a:r>
+              <a:rPr lang="nl-BE" b="1" dirty="0" smtClean="0">
+                <a:latin typeface="Buxton Sketch" panose="03080500000500000004" pitchFamily="66" charset="0"/>
+              </a:rPr>
+              <a:t> </a:t>
+            </a:r>
+            <a:r>
+              <a:rPr lang="nl-BE" b="1" dirty="0" err="1" smtClean="0">
+                <a:latin typeface="Buxton Sketch" panose="03080500000500000004" pitchFamily="66" charset="0"/>
+              </a:rPr>
+              <a:t>to</a:t>
+            </a:r>
+            <a:r>
+              <a:rPr lang="nl-BE" b="1" dirty="0" smtClean="0">
+                <a:latin typeface="Buxton Sketch" panose="03080500000500000004" pitchFamily="66" charset="0"/>
+              </a:rPr>
+              <a:t> start</a:t>
+            </a:r>
+            <a:endParaRPr lang="nl-BE" b="1" dirty="0">
+              <a:latin typeface="Buxton Sketch" panose="03080500000500000004" pitchFamily="66" charset="0"/>
+            </a:endParaRPr>
+          </a:p>
+        </p:txBody>
+      </p:sp>
+      <p:sp>
+        <p:nvSpPr>
+          <p:cNvPr id="9" name="Folded Corner 8"/>
+          <p:cNvSpPr/>
+          <p:nvPr/>
+        </p:nvSpPr>
+        <p:spPr>
+          <a:xfrm rot="20132892">
+            <a:off x="6221749" y="4249507"/>
+            <a:ext cx="2438400" cy="1752600"/>
+          </a:xfrm>
+          <a:prstGeom prst="foldedCorner">
+            <a:avLst/>
+          </a:prstGeom>
+        </p:spPr>
+        <p:style>
+          <a:lnRef idx="1">
+            <a:schemeClr val="accent5"/>
+          </a:lnRef>
+          <a:fillRef idx="2">
+            <a:schemeClr val="accent5"/>
+          </a:fillRef>
+          <a:effectRef idx="1">
+            <a:schemeClr val="accent5"/>
+          </a:effectRef>
+          <a:fontRef idx="minor">
+            <a:schemeClr val="dk1"/>
+          </a:fontRef>
+        </p:style>
+        <p:txBody>
+          <a:bodyPr rtlCol="0" anchor="ctr"/>
+          <a:lstStyle/>
+          <a:p>
+            <a:pPr algn="ctr"/>
+            <a:r>
+              <a:rPr lang="nl-BE" b="1" dirty="0" smtClean="0">
+                <a:latin typeface="Buxton Sketch" panose="03080500000500000004" pitchFamily="66" charset="0"/>
+              </a:rPr>
+              <a:t>I </a:t>
+            </a:r>
+            <a:r>
+              <a:rPr lang="nl-BE" b="1" dirty="0" err="1" smtClean="0">
+                <a:latin typeface="Buxton Sketch" panose="03080500000500000004" pitchFamily="66" charset="0"/>
+              </a:rPr>
+              <a:t>don’t</a:t>
+            </a:r>
+            <a:r>
+              <a:rPr lang="nl-BE" b="1" dirty="0" smtClean="0">
+                <a:latin typeface="Buxton Sketch" panose="03080500000500000004" pitchFamily="66" charset="0"/>
+              </a:rPr>
+              <a:t> have </a:t>
+            </a:r>
+            <a:r>
+              <a:rPr lang="nl-BE" b="1" dirty="0" err="1" smtClean="0">
+                <a:latin typeface="Buxton Sketch" panose="03080500000500000004" pitchFamily="66" charset="0"/>
+              </a:rPr>
+              <a:t>that</a:t>
+            </a:r>
+            <a:r>
+              <a:rPr lang="nl-BE" b="1" dirty="0" smtClean="0">
+                <a:latin typeface="Buxton Sketch" panose="03080500000500000004" pitchFamily="66" charset="0"/>
+              </a:rPr>
+              <a:t> </a:t>
+            </a:r>
+            <a:r>
+              <a:rPr lang="nl-BE" b="1" dirty="0" err="1" smtClean="0">
+                <a:latin typeface="Buxton Sketch" panose="03080500000500000004" pitchFamily="66" charset="0"/>
+              </a:rPr>
+              <a:t>much</a:t>
+            </a:r>
+            <a:r>
+              <a:rPr lang="nl-BE" b="1" dirty="0" smtClean="0">
+                <a:latin typeface="Buxton Sketch" panose="03080500000500000004" pitchFamily="66" charset="0"/>
+              </a:rPr>
+              <a:t> JS code, </a:t>
+            </a:r>
+            <a:r>
+              <a:rPr lang="nl-BE" b="1" dirty="0" err="1" smtClean="0">
+                <a:latin typeface="Buxton Sketch" panose="03080500000500000004" pitchFamily="66" charset="0"/>
+              </a:rPr>
+              <a:t>it</a:t>
+            </a:r>
+            <a:r>
+              <a:rPr lang="nl-BE" b="1" dirty="0" smtClean="0">
+                <a:latin typeface="Buxton Sketch" panose="03080500000500000004" pitchFamily="66" charset="0"/>
+              </a:rPr>
+              <a:t> </a:t>
+            </a:r>
+            <a:r>
+              <a:rPr lang="nl-BE" b="1" dirty="0" err="1" smtClean="0">
+                <a:latin typeface="Buxton Sketch" panose="03080500000500000004" pitchFamily="66" charset="0"/>
+              </a:rPr>
+              <a:t>wouldn’t</a:t>
+            </a:r>
+            <a:r>
+              <a:rPr lang="nl-BE" b="1" dirty="0" smtClean="0">
+                <a:latin typeface="Buxton Sketch" panose="03080500000500000004" pitchFamily="66" charset="0"/>
+              </a:rPr>
+              <a:t> </a:t>
+            </a:r>
+            <a:r>
+              <a:rPr lang="nl-BE" b="1" dirty="0" err="1" smtClean="0">
+                <a:latin typeface="Buxton Sketch" panose="03080500000500000004" pitchFamily="66" charset="0"/>
+              </a:rPr>
+              <a:t>be</a:t>
+            </a:r>
+            <a:r>
+              <a:rPr lang="nl-BE" b="1" dirty="0" smtClean="0">
+                <a:latin typeface="Buxton Sketch" panose="03080500000500000004" pitchFamily="66" charset="0"/>
+              </a:rPr>
+              <a:t> </a:t>
+            </a:r>
+            <a:r>
+              <a:rPr lang="nl-BE" b="1" dirty="0" err="1" smtClean="0">
+                <a:latin typeface="Buxton Sketch" panose="03080500000500000004" pitchFamily="66" charset="0"/>
+              </a:rPr>
+              <a:t>worth</a:t>
+            </a:r>
+            <a:r>
+              <a:rPr lang="nl-BE" b="1" dirty="0" smtClean="0">
+                <a:latin typeface="Buxton Sketch" panose="03080500000500000004" pitchFamily="66" charset="0"/>
+              </a:rPr>
+              <a:t> the effort</a:t>
+            </a:r>
+            <a:endParaRPr lang="nl-BE" b="1" dirty="0">
+              <a:latin typeface="Buxton Sketch" panose="03080500000500000004" pitchFamily="66" charset="0"/>
+            </a:endParaRPr>
+          </a:p>
+        </p:txBody>
+      </p:sp>
+      <p:sp>
+        <p:nvSpPr>
+          <p:cNvPr id="10" name="Folded Corner 9"/>
+          <p:cNvSpPr/>
+          <p:nvPr/>
+        </p:nvSpPr>
+        <p:spPr>
+          <a:xfrm rot="1241733">
+            <a:off x="482533" y="4489122"/>
+            <a:ext cx="2438400" cy="1752600"/>
+          </a:xfrm>
+          <a:prstGeom prst="foldedCorner">
+            <a:avLst/>
+          </a:prstGeom>
+        </p:spPr>
+        <p:style>
+          <a:lnRef idx="1">
+            <a:schemeClr val="accent5"/>
+          </a:lnRef>
+          <a:fillRef idx="2">
+            <a:schemeClr val="accent5"/>
+          </a:fillRef>
+          <a:effectRef idx="1">
+            <a:schemeClr val="accent5"/>
+          </a:effectRef>
+          <a:fontRef idx="minor">
+            <a:schemeClr val="dk1"/>
+          </a:fontRef>
+        </p:style>
+        <p:txBody>
+          <a:bodyPr rtlCol="0" anchor="ctr"/>
+          <a:lstStyle/>
+          <a:p>
+            <a:pPr algn="ctr"/>
+            <a:r>
+              <a:rPr lang="nl-BE" b="1" dirty="0" smtClean="0">
+                <a:latin typeface="Buxton Sketch" panose="03080500000500000004" pitchFamily="66" charset="0"/>
+              </a:rPr>
+              <a:t>My JS code is </a:t>
+            </a:r>
+            <a:r>
+              <a:rPr lang="nl-BE" b="1" dirty="0" err="1" smtClean="0">
+                <a:latin typeface="Buxton Sketch" panose="03080500000500000004" pitchFamily="66" charset="0"/>
+              </a:rPr>
+              <a:t>so</a:t>
+            </a:r>
+            <a:r>
+              <a:rPr lang="nl-BE" b="1" dirty="0" smtClean="0">
+                <a:latin typeface="Buxton Sketch" panose="03080500000500000004" pitchFamily="66" charset="0"/>
+              </a:rPr>
+              <a:t> </a:t>
+            </a:r>
+            <a:r>
+              <a:rPr lang="nl-BE" b="1" dirty="0" err="1" smtClean="0">
+                <a:latin typeface="Buxton Sketch" panose="03080500000500000004" pitchFamily="66" charset="0"/>
+              </a:rPr>
+              <a:t>simple</a:t>
+            </a:r>
+            <a:r>
+              <a:rPr lang="nl-BE" b="1" dirty="0" smtClean="0">
+                <a:latin typeface="Buxton Sketch" panose="03080500000500000004" pitchFamily="66" charset="0"/>
+              </a:rPr>
+              <a:t> </a:t>
+            </a:r>
+            <a:r>
+              <a:rPr lang="nl-BE" b="1" dirty="0" err="1" smtClean="0">
+                <a:latin typeface="Buxton Sketch" panose="03080500000500000004" pitchFamily="66" charset="0"/>
+              </a:rPr>
+              <a:t>it’s</a:t>
+            </a:r>
+            <a:r>
+              <a:rPr lang="nl-BE" b="1" dirty="0" smtClean="0">
+                <a:latin typeface="Buxton Sketch" panose="03080500000500000004" pitchFamily="66" charset="0"/>
+              </a:rPr>
+              <a:t> </a:t>
+            </a:r>
+            <a:r>
+              <a:rPr lang="nl-BE" b="1" dirty="0" err="1" smtClean="0">
+                <a:latin typeface="Buxton Sketch" panose="03080500000500000004" pitchFamily="66" charset="0"/>
+              </a:rPr>
+              <a:t>impossible</a:t>
+            </a:r>
+            <a:r>
+              <a:rPr lang="nl-BE" b="1" dirty="0" smtClean="0">
+                <a:latin typeface="Buxton Sketch" panose="03080500000500000004" pitchFamily="66" charset="0"/>
+              </a:rPr>
+              <a:t> </a:t>
+            </a:r>
+            <a:r>
+              <a:rPr lang="nl-BE" b="1" dirty="0" err="1" smtClean="0">
+                <a:latin typeface="Buxton Sketch" panose="03080500000500000004" pitchFamily="66" charset="0"/>
+              </a:rPr>
+              <a:t>to</a:t>
+            </a:r>
+            <a:r>
+              <a:rPr lang="nl-BE" b="1" dirty="0" smtClean="0">
+                <a:latin typeface="Buxton Sketch" panose="03080500000500000004" pitchFamily="66" charset="0"/>
+              </a:rPr>
+              <a:t> break</a:t>
+            </a:r>
+            <a:endParaRPr lang="nl-BE" b="1" dirty="0">
+              <a:latin typeface="Buxton Sketch" panose="03080500000500000004" pitchFamily="66" charset="0"/>
+            </a:endParaRPr>
+          </a:p>
+        </p:txBody>
+      </p:sp>
+      <p:sp>
+        <p:nvSpPr>
+          <p:cNvPr id="11" name="Folded Corner 10"/>
+          <p:cNvSpPr/>
+          <p:nvPr/>
+        </p:nvSpPr>
+        <p:spPr>
+          <a:xfrm>
+            <a:off x="3276599" y="4859668"/>
+            <a:ext cx="2438400" cy="1752600"/>
+          </a:xfrm>
+          <a:prstGeom prst="foldedCorner">
+            <a:avLst/>
+          </a:prstGeom>
+        </p:spPr>
+        <p:style>
+          <a:lnRef idx="1">
+            <a:schemeClr val="accent5"/>
+          </a:lnRef>
+          <a:fillRef idx="2">
+            <a:schemeClr val="accent5"/>
+          </a:fillRef>
+          <a:effectRef idx="1">
+            <a:schemeClr val="accent5"/>
+          </a:effectRef>
+          <a:fontRef idx="minor">
+            <a:schemeClr val="dk1"/>
+          </a:fontRef>
+        </p:style>
+        <p:txBody>
+          <a:bodyPr rtlCol="0" anchor="ctr"/>
+          <a:lstStyle/>
+          <a:p>
+            <a:pPr algn="ctr"/>
+            <a:r>
+              <a:rPr lang="nl-BE" b="1" dirty="0" err="1" smtClean="0">
+                <a:latin typeface="Buxton Sketch" panose="03080500000500000004" pitchFamily="66" charset="0"/>
+              </a:rPr>
+              <a:t>I’m</a:t>
+            </a:r>
+            <a:r>
+              <a:rPr lang="nl-BE" b="1" dirty="0" smtClean="0">
+                <a:latin typeface="Buxton Sketch" panose="03080500000500000004" pitchFamily="66" charset="0"/>
+              </a:rPr>
+              <a:t> a </a:t>
+            </a:r>
+            <a:r>
+              <a:rPr lang="nl-BE" b="1" dirty="0" err="1" smtClean="0">
+                <a:latin typeface="Buxton Sketch" panose="03080500000500000004" pitchFamily="66" charset="0"/>
+              </a:rPr>
+              <a:t>genious</a:t>
+            </a:r>
+            <a:r>
+              <a:rPr lang="nl-BE" b="1" dirty="0" smtClean="0">
+                <a:latin typeface="Buxton Sketch" panose="03080500000500000004" pitchFamily="66" charset="0"/>
+              </a:rPr>
+              <a:t>, I </a:t>
+            </a:r>
+            <a:r>
+              <a:rPr lang="nl-BE" b="1" dirty="0" err="1" smtClean="0">
+                <a:latin typeface="Buxton Sketch" panose="03080500000500000004" pitchFamily="66" charset="0"/>
+              </a:rPr>
+              <a:t>don’t</a:t>
+            </a:r>
+            <a:r>
+              <a:rPr lang="nl-BE" b="1" dirty="0" smtClean="0">
+                <a:latin typeface="Buxton Sketch" panose="03080500000500000004" pitchFamily="66" charset="0"/>
+              </a:rPr>
+              <a:t> </a:t>
+            </a:r>
+            <a:r>
+              <a:rPr lang="nl-BE" b="1" dirty="0" err="1" smtClean="0">
+                <a:latin typeface="Buxton Sketch" panose="03080500000500000004" pitchFamily="66" charset="0"/>
+              </a:rPr>
+              <a:t>need</a:t>
+            </a:r>
+            <a:r>
+              <a:rPr lang="nl-BE" b="1" dirty="0" smtClean="0">
+                <a:latin typeface="Buxton Sketch" panose="03080500000500000004" pitchFamily="66" charset="0"/>
+              </a:rPr>
+              <a:t> </a:t>
+            </a:r>
+            <a:r>
+              <a:rPr lang="nl-BE" b="1" dirty="0" err="1" smtClean="0">
+                <a:latin typeface="Buxton Sketch" panose="03080500000500000004" pitchFamily="66" charset="0"/>
+              </a:rPr>
+              <a:t>testing</a:t>
+            </a:r>
+            <a:endParaRPr lang="nl-BE" b="1" dirty="0">
+              <a:latin typeface="Buxton Sketch" panose="03080500000500000004" pitchFamily="66" charset="0"/>
+            </a:endParaRPr>
+          </a:p>
+        </p:txBody>
+      </p:sp>
+      <p:sp>
+        <p:nvSpPr>
+          <p:cNvPr id="12" name="Folded Corner 11"/>
+          <p:cNvSpPr/>
+          <p:nvPr/>
+        </p:nvSpPr>
+        <p:spPr>
+          <a:xfrm>
+            <a:off x="6221749" y="2019352"/>
+            <a:ext cx="2438400" cy="1752600"/>
+          </a:xfrm>
+          <a:prstGeom prst="foldedCorner">
+            <a:avLst/>
+          </a:prstGeom>
+        </p:spPr>
+        <p:style>
+          <a:lnRef idx="1">
+            <a:schemeClr val="accent5"/>
+          </a:lnRef>
+          <a:fillRef idx="2">
+            <a:schemeClr val="accent5"/>
+          </a:fillRef>
+          <a:effectRef idx="1">
+            <a:schemeClr val="accent5"/>
+          </a:effectRef>
+          <a:fontRef idx="minor">
+            <a:schemeClr val="dk1"/>
+          </a:fontRef>
+        </p:style>
+        <p:txBody>
+          <a:bodyPr rtlCol="0" anchor="ctr"/>
+          <a:lstStyle/>
+          <a:p>
+            <a:pPr algn="ctr"/>
+            <a:r>
+              <a:rPr lang="nl-BE" b="1" dirty="0" smtClean="0">
+                <a:latin typeface="Buxton Sketch" panose="03080500000500000004" pitchFamily="66" charset="0"/>
+              </a:rPr>
+              <a:t>I </a:t>
+            </a:r>
+            <a:r>
+              <a:rPr lang="nl-BE" b="1" dirty="0" err="1" smtClean="0">
+                <a:latin typeface="Buxton Sketch" panose="03080500000500000004" pitchFamily="66" charset="0"/>
+              </a:rPr>
+              <a:t>can’t</a:t>
+            </a:r>
+            <a:r>
+              <a:rPr lang="nl-BE" b="1" dirty="0" smtClean="0">
+                <a:latin typeface="Buxton Sketch" panose="03080500000500000004" pitchFamily="66" charset="0"/>
+              </a:rPr>
+              <a:t> run these tests </a:t>
+            </a:r>
+            <a:r>
+              <a:rPr lang="nl-BE" b="1" dirty="0" err="1" smtClean="0">
+                <a:latin typeface="Buxton Sketch" panose="03080500000500000004" pitchFamily="66" charset="0"/>
+              </a:rPr>
+              <a:t>within</a:t>
+            </a:r>
+            <a:r>
+              <a:rPr lang="nl-BE" b="1" dirty="0" smtClean="0">
+                <a:latin typeface="Buxton Sketch" panose="03080500000500000004" pitchFamily="66" charset="0"/>
+              </a:rPr>
+              <a:t> </a:t>
+            </a:r>
+            <a:r>
+              <a:rPr lang="nl-BE" b="1" dirty="0" err="1" smtClean="0">
+                <a:latin typeface="Buxton Sketch" panose="03080500000500000004" pitchFamily="66" charset="0"/>
+              </a:rPr>
+              <a:t>my</a:t>
+            </a:r>
+            <a:r>
+              <a:rPr lang="nl-BE" b="1" dirty="0" smtClean="0">
+                <a:latin typeface="Buxton Sketch" panose="03080500000500000004" pitchFamily="66" charset="0"/>
+              </a:rPr>
+              <a:t> </a:t>
+            </a:r>
+            <a:r>
+              <a:rPr lang="nl-BE" b="1" dirty="0" err="1" smtClean="0">
+                <a:latin typeface="Buxton Sketch" panose="03080500000500000004" pitchFamily="66" charset="0"/>
+              </a:rPr>
+              <a:t>favourite</a:t>
+            </a:r>
+            <a:r>
+              <a:rPr lang="nl-BE" b="1" dirty="0" smtClean="0">
+                <a:latin typeface="Buxton Sketch" panose="03080500000500000004" pitchFamily="66" charset="0"/>
+              </a:rPr>
+              <a:t> IDE (</a:t>
+            </a:r>
+            <a:r>
+              <a:rPr lang="nl-BE" b="1" dirty="0" err="1" smtClean="0">
+                <a:latin typeface="Buxton Sketch" panose="03080500000500000004" pitchFamily="66" charset="0"/>
+              </a:rPr>
+              <a:t>being</a:t>
+            </a:r>
+            <a:r>
+              <a:rPr lang="nl-BE" b="1" dirty="0" smtClean="0">
+                <a:latin typeface="Buxton Sketch" panose="03080500000500000004" pitchFamily="66" charset="0"/>
+              </a:rPr>
+              <a:t> Visual Studio of course)</a:t>
+            </a:r>
+            <a:endParaRPr lang="nl-BE" b="1" dirty="0">
+              <a:latin typeface="Buxton Sketch" panose="03080500000500000004" pitchFamily="66" charset="0"/>
+            </a:endParaRPr>
+          </a:p>
+        </p:txBody>
+      </p:sp>
+      <p:sp>
+        <p:nvSpPr>
+          <p:cNvPr id="13" name="Folded Corner 12"/>
+          <p:cNvSpPr/>
+          <p:nvPr/>
+        </p:nvSpPr>
+        <p:spPr>
+          <a:xfrm>
+            <a:off x="477993" y="2805255"/>
+            <a:ext cx="1939615" cy="1334826"/>
+          </a:xfrm>
+          <a:prstGeom prst="foldedCorner">
+            <a:avLst/>
+          </a:prstGeom>
+        </p:spPr>
+        <p:style>
+          <a:lnRef idx="1">
+            <a:schemeClr val="accent5"/>
+          </a:lnRef>
+          <a:fillRef idx="2">
+            <a:schemeClr val="accent5"/>
+          </a:fillRef>
+          <a:effectRef idx="1">
+            <a:schemeClr val="accent5"/>
+          </a:effectRef>
+          <a:fontRef idx="minor">
+            <a:schemeClr val="dk1"/>
+          </a:fontRef>
+        </p:style>
+        <p:txBody>
+          <a:bodyPr rtlCol="0" anchor="ctr"/>
+          <a:lstStyle/>
+          <a:p>
+            <a:pPr algn="ctr"/>
+            <a:r>
+              <a:rPr lang="nl-BE" b="1" dirty="0" smtClean="0">
+                <a:latin typeface="Buxton Sketch" panose="03080500000500000004" pitchFamily="66" charset="0"/>
+              </a:rPr>
+              <a:t>Running UI tests takes </a:t>
+            </a:r>
+            <a:r>
+              <a:rPr lang="nl-BE" b="1" dirty="0" err="1" smtClean="0">
+                <a:latin typeface="Buxton Sketch" panose="03080500000500000004" pitchFamily="66" charset="0"/>
+              </a:rPr>
+              <a:t>too</a:t>
+            </a:r>
+            <a:r>
+              <a:rPr lang="nl-BE" b="1" dirty="0" smtClean="0">
+                <a:latin typeface="Buxton Sketch" panose="03080500000500000004" pitchFamily="66" charset="0"/>
+              </a:rPr>
+              <a:t> </a:t>
+            </a:r>
+            <a:r>
+              <a:rPr lang="nl-BE" b="1" dirty="0" err="1" smtClean="0">
+                <a:latin typeface="Buxton Sketch" panose="03080500000500000004" pitchFamily="66" charset="0"/>
+              </a:rPr>
+              <a:t>much</a:t>
+            </a:r>
+            <a:r>
+              <a:rPr lang="nl-BE" b="1" dirty="0" smtClean="0">
+                <a:latin typeface="Buxton Sketch" panose="03080500000500000004" pitchFamily="66" charset="0"/>
+              </a:rPr>
+              <a:t> time</a:t>
+            </a:r>
+            <a:endParaRPr lang="nl-BE" b="1" dirty="0">
+              <a:latin typeface="Buxton Sketch" panose="03080500000500000004" pitchFamily="66" charset="0"/>
+            </a:endParaRPr>
+          </a:p>
+        </p:txBody>
+      </p:sp>
+    </p:spTree>
+    <p:extLst>
+      <p:ext uri="{BB962C8B-B14F-4D97-AF65-F5344CB8AC3E}">
+        <p14:creationId xmlns:p14="http://schemas.microsoft.com/office/powerpoint/2010/main" val="3140034788"/>
+      </p:ext>
+    </p:extLst>
+  </p:cSld>
+  <p:clrMapOvr>
+    <a:masterClrMapping/>
+  </p:clrMapOvr>
+  <p:timing>
+    <p:tnLst>
+      <p:par>
+        <p:cTn id="1" dur="indefinite" restart="never" nodeType="tmRoot">
+          <p:childTnLst>
+            <p:seq concurrent="1" nextAc="seek">
+              <p:cTn id="2" dur="indefinite" nodeType="mainSeq">
+                <p:childTnLst>
+                  <p:par>
+                    <p:cTn id="3" fill="hold">
+                      <p:stCondLst>
+                        <p:cond delay="indefinite"/>
+                      </p:stCondLst>
+                      <p:childTnLst>
+                        <p:par>
+                          <p:cTn id="4" fill="hold">
+                            <p:stCondLst>
+                              <p:cond delay="0"/>
+                            </p:stCondLst>
+                            <p:childTnLst>
+                              <p:par>
+                                <p:cTn id="5" presetID="1" presetClass="entr" presetSubtype="0" fill="hold" grpId="0" nodeType="clickEffect">
+                                  <p:stCondLst>
+                                    <p:cond delay="0"/>
+                                  </p:stCondLst>
+                                  <p:childTnLst>
+                                    <p:set>
+                                      <p:cBhvr>
+                                        <p:cTn id="6" dur="1" fill="hold">
+                                          <p:stCondLst>
+                                            <p:cond delay="0"/>
+                                          </p:stCondLst>
+                                        </p:cTn>
+                                        <p:tgtEl>
+                                          <p:spTgt spid="8"/>
+                                        </p:tgtEl>
+                                        <p:attrNameLst>
+                                          <p:attrName>style.visibility</p:attrName>
+                                        </p:attrNameLst>
+                                      </p:cBhvr>
+                                      <p:to>
+                                        <p:strVal val="visible"/>
+                                      </p:to>
+                                    </p:set>
+                                  </p:childTnLst>
+                                </p:cTn>
+                              </p:par>
+                            </p:childTnLst>
+                          </p:cTn>
+                        </p:par>
+                      </p:childTnLst>
+                    </p:cTn>
+                  </p:par>
+                  <p:par>
+                    <p:cTn id="7" fill="hold">
+                      <p:stCondLst>
+                        <p:cond delay="indefinite"/>
+                      </p:stCondLst>
+                      <p:childTnLst>
+                        <p:par>
+                          <p:cTn id="8" fill="hold">
+                            <p:stCondLst>
+                              <p:cond delay="0"/>
+                            </p:stCondLst>
+                            <p:childTnLst>
+                              <p:par>
+                                <p:cTn id="9" presetID="1" presetClass="entr" presetSubtype="0" fill="hold" grpId="0" nodeType="clickEffect">
+                                  <p:stCondLst>
+                                    <p:cond delay="0"/>
+                                  </p:stCondLst>
+                                  <p:childTnLst>
+                                    <p:set>
+                                      <p:cBhvr>
+                                        <p:cTn id="10" dur="1" fill="hold">
+                                          <p:stCondLst>
+                                            <p:cond delay="0"/>
+                                          </p:stCondLst>
+                                        </p:cTn>
+                                        <p:tgtEl>
+                                          <p:spTgt spid="10"/>
+                                        </p:tgtEl>
+                                        <p:attrNameLst>
+                                          <p:attrName>style.visibility</p:attrName>
+                                        </p:attrNameLst>
+                                      </p:cBhvr>
+                                      <p:to>
+                                        <p:strVal val="visible"/>
+                                      </p:to>
+                                    </p:set>
+                                  </p:childTnLst>
+                                </p:cTn>
+                              </p:par>
+                            </p:childTnLst>
+                          </p:cTn>
+                        </p:par>
+                      </p:childTnLst>
+                    </p:cTn>
+                  </p:par>
+                  <p:par>
+                    <p:cTn id="11" fill="hold">
+                      <p:stCondLst>
+                        <p:cond delay="indefinite"/>
+                      </p:stCondLst>
+                      <p:childTnLst>
+                        <p:par>
+                          <p:cTn id="12" fill="hold">
+                            <p:stCondLst>
+                              <p:cond delay="0"/>
+                            </p:stCondLst>
+                            <p:childTnLst>
+                              <p:par>
+                                <p:cTn id="13" presetID="1" presetClass="entr" presetSubtype="0" fill="hold" grpId="0" nodeType="clickEffect">
+                                  <p:stCondLst>
+                                    <p:cond delay="0"/>
+                                  </p:stCondLst>
+                                  <p:childTnLst>
+                                    <p:set>
+                                      <p:cBhvr>
+                                        <p:cTn id="14" dur="1" fill="hold">
+                                          <p:stCondLst>
+                                            <p:cond delay="0"/>
+                                          </p:stCondLst>
+                                        </p:cTn>
+                                        <p:tgtEl>
+                                          <p:spTgt spid="12"/>
+                                        </p:tgtEl>
+                                        <p:attrNameLst>
+                                          <p:attrName>style.visibility</p:attrName>
+                                        </p:attrNameLst>
+                                      </p:cBhvr>
+                                      <p:to>
+                                        <p:strVal val="visible"/>
+                                      </p:to>
+                                    </p:set>
+                                  </p:childTnLst>
+                                </p:cTn>
+                              </p:par>
+                            </p:childTnLst>
+                          </p:cTn>
+                        </p:par>
+                      </p:childTnLst>
+                    </p:cTn>
+                  </p:par>
+                  <p:par>
+                    <p:cTn id="15" fill="hold">
+                      <p:stCondLst>
+                        <p:cond delay="indefinite"/>
+                      </p:stCondLst>
+                      <p:childTnLst>
+                        <p:par>
+                          <p:cTn id="16" fill="hold">
+                            <p:stCondLst>
+                              <p:cond delay="0"/>
+                            </p:stCondLst>
+                            <p:childTnLst>
+                              <p:par>
+                                <p:cTn id="17" presetID="1" presetClass="entr" presetSubtype="0" fill="hold" grpId="0" nodeType="clickEffect">
+                                  <p:stCondLst>
+                                    <p:cond delay="0"/>
+                                  </p:stCondLst>
+                                  <p:childTnLst>
+                                    <p:set>
+                                      <p:cBhvr>
+                                        <p:cTn id="18" dur="1" fill="hold">
+                                          <p:stCondLst>
+                                            <p:cond delay="0"/>
+                                          </p:stCondLst>
+                                        </p:cTn>
+                                        <p:tgtEl>
+                                          <p:spTgt spid="11"/>
+                                        </p:tgtEl>
+                                        <p:attrNameLst>
+                                          <p:attrName>style.visibility</p:attrName>
+                                        </p:attrNameLst>
+                                      </p:cBhvr>
+                                      <p:to>
+                                        <p:strVal val="visible"/>
+                                      </p:to>
+                                    </p:set>
+                                  </p:childTnLst>
+                                </p:cTn>
+                              </p:par>
+                            </p:childTnLst>
+                          </p:cTn>
+                        </p:par>
+                      </p:childTnLst>
+                    </p:cTn>
+                  </p:par>
+                  <p:par>
+                    <p:cTn id="19" fill="hold">
+                      <p:stCondLst>
+                        <p:cond delay="indefinite"/>
+                      </p:stCondLst>
+                      <p:childTnLst>
+                        <p:par>
+                          <p:cTn id="20" fill="hold">
+                            <p:stCondLst>
+                              <p:cond delay="0"/>
+                            </p:stCondLst>
+                            <p:childTnLst>
+                              <p:par>
+                                <p:cTn id="21" presetID="1" presetClass="entr" presetSubtype="0" fill="hold" grpId="0" nodeType="clickEffect">
+                                  <p:stCondLst>
+                                    <p:cond delay="0"/>
+                                  </p:stCondLst>
+                                  <p:childTnLst>
+                                    <p:set>
+                                      <p:cBhvr>
+                                        <p:cTn id="22" dur="1" fill="hold">
+                                          <p:stCondLst>
+                                            <p:cond delay="0"/>
+                                          </p:stCondLst>
+                                        </p:cTn>
+                                        <p:tgtEl>
+                                          <p:spTgt spid="9"/>
+                                        </p:tgtEl>
+                                        <p:attrNameLst>
+                                          <p:attrName>style.visibility</p:attrName>
+                                        </p:attrNameLst>
+                                      </p:cBhvr>
+                                      <p:to>
+                                        <p:strVal val="visible"/>
+                                      </p:to>
+                                    </p:set>
+                                  </p:childTnLst>
+                                </p:cTn>
+                              </p:par>
+                            </p:childTnLst>
+                          </p:cTn>
+                        </p:par>
+                      </p:childTnLst>
+                    </p:cTn>
+                  </p:par>
+                  <p:par>
+                    <p:cTn id="23" fill="hold">
+                      <p:stCondLst>
+                        <p:cond delay="indefinite"/>
+                      </p:stCondLst>
+                      <p:childTnLst>
+                        <p:par>
+                          <p:cTn id="24" fill="hold">
+                            <p:stCondLst>
+                              <p:cond delay="0"/>
+                            </p:stCondLst>
+                            <p:childTnLst>
+                              <p:par>
+                                <p:cTn id="25" presetID="1" presetClass="entr" presetSubtype="0" fill="hold" grpId="0" nodeType="clickEffect">
+                                  <p:stCondLst>
+                                    <p:cond delay="0"/>
+                                  </p:stCondLst>
+                                  <p:childTnLst>
+                                    <p:set>
+                                      <p:cBhvr>
+                                        <p:cTn id="26" dur="1" fill="hold">
+                                          <p:stCondLst>
+                                            <p:cond delay="0"/>
+                                          </p:stCondLst>
+                                        </p:cTn>
+                                        <p:tgtEl>
+                                          <p:spTgt spid="3"/>
+                                        </p:tgtEl>
+                                        <p:attrNameLst>
+                                          <p:attrName>style.visibility</p:attrName>
+                                        </p:attrNameLst>
+                                      </p:cBhvr>
+                                      <p:to>
+                                        <p:strVal val="visible"/>
+                                      </p:to>
+                                    </p:set>
+                                  </p:childTnLst>
+                                </p:cTn>
+                              </p:par>
+                            </p:childTnLst>
+                          </p:cTn>
+                        </p:par>
+                      </p:childTnLst>
+                    </p:cTn>
+                  </p:par>
+                  <p:par>
+                    <p:cTn id="27" fill="hold">
+                      <p:stCondLst>
+                        <p:cond delay="indefinite"/>
+                      </p:stCondLst>
+                      <p:childTnLst>
+                        <p:par>
+                          <p:cTn id="28" fill="hold">
+                            <p:stCondLst>
+                              <p:cond delay="0"/>
+                            </p:stCondLst>
+                            <p:childTnLst>
+                              <p:par>
+                                <p:cTn id="29" presetID="1" presetClass="entr" presetSubtype="0" fill="hold" grpId="0" nodeType="clickEffect">
+                                  <p:stCondLst>
+                                    <p:cond delay="0"/>
+                                  </p:stCondLst>
+                                  <p:childTnLst>
+                                    <p:set>
+                                      <p:cBhvr>
+                                        <p:cTn id="30" dur="1" fill="hold">
+                                          <p:stCondLst>
+                                            <p:cond delay="0"/>
+                                          </p:stCondLst>
+                                        </p:cTn>
+                                        <p:tgtEl>
+                                          <p:spTgt spid="13"/>
+                                        </p:tgtEl>
+                                        <p:attrNameLst>
+                                          <p:attrName>style.visibility</p:attrName>
+                                        </p:attrNameLst>
+                                      </p:cBhvr>
+                                      <p:to>
+                                        <p:strVal val="visible"/>
+                                      </p:to>
+                                    </p:set>
+                                  </p:childTnLst>
+                                </p:cTn>
+                              </p:par>
+                            </p:childTnLst>
+                          </p:cTn>
+                        </p:par>
+                      </p:childTnLst>
+                    </p:cTn>
+                  </p:par>
+                </p:childTnLst>
+              </p:cTn>
+              <p:prevCondLst>
+                <p:cond evt="onPrev" delay="0">
+                  <p:tgtEl>
+                    <p:sldTgt/>
+                  </p:tgtEl>
+                </p:cond>
+              </p:prevCondLst>
+              <p:nextCondLst>
+                <p:cond evt="onNext" delay="0">
+                  <p:tgtEl>
+                    <p:sldTgt/>
+                  </p:tgtEl>
+                </p:cond>
+              </p:nextCondLst>
+            </p:seq>
+          </p:childTnLst>
+        </p:cTn>
+      </p:par>
+    </p:tnLst>
+    <p:bldLst>
+      <p:bldP spid="3" grpId="0" animBg="1"/>
+      <p:bldP spid="8" grpId="0" animBg="1"/>
+      <p:bldP spid="9" grpId="0" animBg="1"/>
+      <p:bldP spid="10" grpId="0" animBg="1"/>
+      <p:bldP spid="11" grpId="0" animBg="1"/>
+      <p:bldP spid="12" grpId="0" animBg="1"/>
+      <p:bldP spid="13" grpId="0" animBg="1"/>
+    </p:bldLst>
+  </p:timing>
+</p:sld>
+</file>
+
+<file path=ppt/slides/slide18.xml><?xml version="1.0" encoding="utf-8"?>
+<p:sld xmlns:a="http://schemas.openxmlformats.org/drawingml/2006/main" xmlns:r="http://schemas.openxmlformats.org/officeDocument/2006/relationships" xmlns:p="http://schemas.openxmlformats.org/presentationml/2006/main">
+  <p:cSld>
+    <p:spTree>
+      <p:nvGrpSpPr>
+        <p:cNvPr id="1" name=""/>
+        <p:cNvGrpSpPr/>
+        <p:nvPr/>
+      </p:nvGrpSpPr>
+      <p:grpSpPr>
+        <a:xfrm>
+          <a:off x="0" y="0"/>
+          <a:ext cx="0" cy="0"/>
+          <a:chOff x="0" y="0"/>
+          <a:chExt cx="0" cy="0"/>
+        </a:xfrm>
+      </p:grpSpPr>
+      <p:sp>
+        <p:nvSpPr>
+          <p:cNvPr id="5" name="Title 4"/>
+          <p:cNvSpPr>
+            <a:spLocks noGrp="1"/>
+          </p:cNvSpPr>
+          <p:nvPr>
+            <p:ph type="title"/>
+          </p:nvPr>
+        </p:nvSpPr>
+        <p:spPr/>
+        <p:txBody>
+          <a:bodyPr/>
+          <a:lstStyle/>
+          <a:p>
+            <a:r>
+              <a:rPr lang="en-US" dirty="0" smtClean="0"/>
+              <a:t>Testing: Jasmine &amp; </a:t>
+            </a:r>
+            <a:r>
+              <a:rPr lang="en-US" dirty="0" err="1" smtClean="0"/>
+              <a:t>PhantomJs</a:t>
+            </a:r>
+            <a:endParaRPr lang="nl-BE" dirty="0"/>
+          </a:p>
+        </p:txBody>
+      </p:sp>
+      <p:sp>
+        <p:nvSpPr>
+          <p:cNvPr id="2" name="Content Placeholder 1"/>
+          <p:cNvSpPr>
+            <a:spLocks noGrp="1"/>
+          </p:cNvSpPr>
+          <p:nvPr>
+            <p:ph idx="1"/>
+          </p:nvPr>
+        </p:nvSpPr>
+        <p:spPr/>
+        <p:txBody>
+          <a:bodyPr/>
+          <a:lstStyle/>
+          <a:p>
+            <a:r>
+              <a:rPr lang="nl-BE" dirty="0">
+                <a:hlinkClick r:id="rId2"/>
+              </a:rPr>
+              <a:t>http://pivotal.github.io/jasmine</a:t>
+            </a:r>
+            <a:r>
+              <a:rPr lang="nl-BE" dirty="0" smtClean="0">
+                <a:hlinkClick r:id="rId2"/>
+              </a:rPr>
+              <a:t>/</a:t>
+            </a:r>
+            <a:endParaRPr lang="nl-BE" dirty="0" smtClean="0"/>
+          </a:p>
+          <a:p>
+            <a:pPr lvl="2"/>
+            <a:r>
+              <a:rPr lang="nl-BE" dirty="0" smtClean="0"/>
+              <a:t>Unit </a:t>
+            </a:r>
+            <a:r>
+              <a:rPr lang="nl-BE" dirty="0" err="1" smtClean="0"/>
+              <a:t>testing</a:t>
+            </a:r>
+            <a:r>
+              <a:rPr lang="nl-BE" dirty="0" smtClean="0"/>
+              <a:t> FW</a:t>
+            </a:r>
+          </a:p>
+          <a:p>
+            <a:pPr lvl="2"/>
+            <a:r>
+              <a:rPr lang="nl-BE" dirty="0" smtClean="0"/>
+              <a:t>Test runner</a:t>
+            </a:r>
+          </a:p>
+          <a:p>
+            <a:pPr lvl="2"/>
+            <a:r>
+              <a:rPr lang="nl-BE" dirty="0" smtClean="0"/>
+              <a:t>BDD-</a:t>
+            </a:r>
+            <a:r>
+              <a:rPr lang="nl-BE" dirty="0" err="1" smtClean="0"/>
+              <a:t>style</a:t>
+            </a:r>
+            <a:endParaRPr lang="nl-BE" dirty="0" smtClean="0"/>
+          </a:p>
+          <a:p>
+            <a:pPr lvl="2"/>
+            <a:r>
+              <a:rPr lang="nl-BE" dirty="0" err="1" smtClean="0"/>
+              <a:t>Matchers</a:t>
+            </a:r>
+            <a:endParaRPr lang="nl-BE" dirty="0" smtClean="0"/>
+          </a:p>
+          <a:p>
+            <a:r>
+              <a:rPr lang="nl-BE" dirty="0">
+                <a:hlinkClick r:id="rId3"/>
+              </a:rPr>
+              <a:t>http://phantomjs.org</a:t>
+            </a:r>
+            <a:r>
+              <a:rPr lang="nl-BE" dirty="0" smtClean="0">
+                <a:hlinkClick r:id="rId3"/>
+              </a:rPr>
+              <a:t>/</a:t>
+            </a:r>
+            <a:endParaRPr lang="nl-BE" dirty="0" smtClean="0"/>
+          </a:p>
+          <a:p>
+            <a:pPr lvl="1"/>
+            <a:r>
+              <a:rPr lang="nl-BE" dirty="0" err="1" smtClean="0"/>
+              <a:t>Headless</a:t>
+            </a:r>
+            <a:r>
+              <a:rPr lang="nl-BE" dirty="0" smtClean="0"/>
+              <a:t> website </a:t>
+            </a:r>
+            <a:r>
+              <a:rPr lang="nl-BE" dirty="0" err="1" smtClean="0"/>
+              <a:t>testing</a:t>
+            </a:r>
+            <a:endParaRPr lang="nl-BE" dirty="0" smtClean="0"/>
+          </a:p>
+          <a:p>
+            <a:pPr lvl="1"/>
+            <a:endParaRPr lang="nl-BE" dirty="0"/>
+          </a:p>
+          <a:p>
+            <a:r>
+              <a:rPr lang="nl-BE" dirty="0" smtClean="0"/>
+              <a:t>VS Integration</a:t>
+            </a:r>
+            <a:endParaRPr lang="nl-BE" dirty="0"/>
+          </a:p>
+        </p:txBody>
+      </p:sp>
+    </p:spTree>
+    <p:extLst>
+      <p:ext uri="{BB962C8B-B14F-4D97-AF65-F5344CB8AC3E}">
+        <p14:creationId xmlns:p14="http://schemas.microsoft.com/office/powerpoint/2010/main" val="3994350105"/>
+      </p:ext>
+    </p:extLst>
+  </p:cSld>
+  <p:clrMapOvr>
+    <a:masterClrMapping/>
+  </p:clrMapOvr>
+  <p:timing>
+    <p:tnLst>
+      <p:par>
+        <p:cTn id="1" dur="indefinite" restart="never" nodeType="tmRoot"/>
+      </p:par>
+    </p:tnLst>
+  </p:timing>
+</p:sld>
+</file>
+
+<file path=ppt/slides/slide19.xml><?xml version="1.0" encoding="utf-8"?>
+<p:sld xmlns:a="http://schemas.openxmlformats.org/drawingml/2006/main" xmlns:r="http://schemas.openxmlformats.org/officeDocument/2006/relationships" xmlns:p="http://schemas.openxmlformats.org/presentationml/2006/main">
+  <p:cSld>
+    <p:spTree>
+      <p:nvGrpSpPr>
+        <p:cNvPr id="1" name=""/>
+        <p:cNvGrpSpPr/>
+        <p:nvPr/>
+      </p:nvGrpSpPr>
+      <p:grpSpPr>
+        <a:xfrm>
+          <a:off x="0" y="0"/>
+          <a:ext cx="0" cy="0"/>
+          <a:chOff x="0" y="0"/>
+          <a:chExt cx="0" cy="0"/>
+        </a:xfrm>
+      </p:grpSpPr>
+      <p:sp>
+        <p:nvSpPr>
+          <p:cNvPr id="5" name="Title 4"/>
+          <p:cNvSpPr>
+            <a:spLocks noGrp="1"/>
+          </p:cNvSpPr>
+          <p:nvPr>
+            <p:ph type="title"/>
+          </p:nvPr>
+        </p:nvSpPr>
+        <p:spPr/>
+        <p:txBody>
+          <a:bodyPr/>
+          <a:lstStyle/>
+          <a:p>
+            <a:r>
+              <a:rPr lang="en-US" dirty="0" smtClean="0"/>
               <a:t>References</a:t>
             </a:r>
             <a:endParaRPr lang="nl-BE" dirty="0"/>
@@ -8542,7 +9859,7 @@
     </p:spTree>
     <p:extLst>
       <p:ext uri="{BB962C8B-B14F-4D97-AF65-F5344CB8AC3E}">
-        <p14:creationId xmlns:p14="http://schemas.microsoft.com/office/powerpoint/2010/main" xmlns="" val="4059509388"/>
+        <p14:creationId xmlns:p14="http://schemas.microsoft.com/office/powerpoint/2010/main" val="4059509388"/>
       </p:ext>
     </p:extLst>
   </p:cSld>
@@ -8604,11 +9921,7 @@
             </a:r>
             <a:r>
               <a:rPr lang="en-US" dirty="0" smtClean="0"/>
-              <a:t> </a:t>
-            </a:r>
-            <a:r>
-              <a:rPr lang="en-US" dirty="0" smtClean="0"/>
-              <a:t>Validate</a:t>
+              <a:t> Validate</a:t>
             </a:r>
             <a:endParaRPr lang="nl-BE" dirty="0" smtClean="0"/>
           </a:p>
@@ -8635,7 +9948,7 @@
     </p:spTree>
     <p:extLst>
       <p:ext uri="{BB962C8B-B14F-4D97-AF65-F5344CB8AC3E}">
-        <p14:creationId xmlns:p14="http://schemas.microsoft.com/office/powerpoint/2010/main" xmlns="" val="1267957920"/>
+        <p14:creationId xmlns:p14="http://schemas.microsoft.com/office/powerpoint/2010/main" val="1267957920"/>
       </p:ext>
     </p:extLst>
   </p:cSld>
@@ -8957,7 +10270,7 @@
     </p:spTree>
     <p:extLst>
       <p:ext uri="{BB962C8B-B14F-4D97-AF65-F5344CB8AC3E}">
-        <p14:creationId xmlns:p14="http://schemas.microsoft.com/office/powerpoint/2010/main" xmlns="" val="3842584209"/>
+        <p14:creationId xmlns:p14="http://schemas.microsoft.com/office/powerpoint/2010/main" val="3842584209"/>
       </p:ext>
     </p:extLst>
   </p:cSld>
@@ -10062,7 +11375,7 @@
     </p:spTree>
     <p:extLst>
       <p:ext uri="{BB962C8B-B14F-4D97-AF65-F5344CB8AC3E}">
-        <p14:creationId xmlns:p14="http://schemas.microsoft.com/office/powerpoint/2010/main" xmlns="" val="3437518475"/>
+        <p14:creationId xmlns:p14="http://schemas.microsoft.com/office/powerpoint/2010/main" val="3437518475"/>
       </p:ext>
     </p:extLst>
   </p:cSld>
@@ -11712,7 +13025,7 @@
     </p:spTree>
     <p:extLst>
       <p:ext uri="{BB962C8B-B14F-4D97-AF65-F5344CB8AC3E}">
-        <p14:creationId xmlns:p14="http://schemas.microsoft.com/office/powerpoint/2010/main" xmlns="" val="3437518475"/>
+        <p14:creationId xmlns:p14="http://schemas.microsoft.com/office/powerpoint/2010/main" val="3437518475"/>
       </p:ext>
     </p:extLst>
   </p:cSld>
@@ -13513,7 +14826,7 @@
     </p:spTree>
     <p:extLst>
       <p:ext uri="{BB962C8B-B14F-4D97-AF65-F5344CB8AC3E}">
-        <p14:creationId xmlns:p14="http://schemas.microsoft.com/office/powerpoint/2010/main" xmlns="" val="2710161560"/>
+        <p14:creationId xmlns:p14="http://schemas.microsoft.com/office/powerpoint/2010/main" val="2710161560"/>
       </p:ext>
     </p:extLst>
   </p:cSld>
@@ -15122,7 +16435,7 @@
     </p:spTree>
     <p:extLst>
       <p:ext uri="{BB962C8B-B14F-4D97-AF65-F5344CB8AC3E}">
-        <p14:creationId xmlns:p14="http://schemas.microsoft.com/office/powerpoint/2010/main" xmlns="" val="1963849782"/>
+        <p14:creationId xmlns:p14="http://schemas.microsoft.com/office/powerpoint/2010/main" val="1963849782"/>
       </p:ext>
     </p:extLst>
   </p:cSld>
@@ -15988,7 +17301,7 @@
     </p:spTree>
     <p:extLst>
       <p:ext uri="{BB962C8B-B14F-4D97-AF65-F5344CB8AC3E}">
-        <p14:creationId xmlns:p14="http://schemas.microsoft.com/office/powerpoint/2010/main" xmlns="" val="205797419"/>
+        <p14:creationId xmlns:p14="http://schemas.microsoft.com/office/powerpoint/2010/main" val="205797419"/>
       </p:ext>
     </p:extLst>
   </p:cSld>
@@ -16819,7 +18132,7 @@
     </p:spTree>
     <p:extLst>
       <p:ext uri="{BB962C8B-B14F-4D97-AF65-F5344CB8AC3E}">
-        <p14:creationId xmlns:p14="http://schemas.microsoft.com/office/powerpoint/2010/main" xmlns="" val="3219053044"/>
+        <p14:creationId xmlns:p14="http://schemas.microsoft.com/office/powerpoint/2010/main" val="3219053044"/>
       </p:ext>
     </p:extLst>
   </p:cSld>
@@ -18113,18 +19426,18 @@
 </file>
 
 <file path=customXml/item1.xml><?xml version="1.0" encoding="utf-8"?>
+<p:properties xmlns:p="http://schemas.microsoft.com/office/2006/metadata/properties" xmlns:xsi="http://www.w3.org/2001/XMLSchema-instance" xmlns:pc="http://schemas.microsoft.com/office/infopath/2007/PartnerControls">
+  <documentManagement/>
+</p:properties>
+</file>
+
+<file path=customXml/item2.xml><?xml version="1.0" encoding="utf-8"?>
 <?mso-contentType ?>
 <FormTemplates xmlns="http://schemas.microsoft.com/sharepoint/v3/contenttype/forms">
   <Display>DocumentLibraryForm</Display>
   <Edit>DocumentLibraryForm</Edit>
   <New>DocumentLibraryForm</New>
 </FormTemplates>
-</file>
-
-<file path=customXml/item2.xml><?xml version="1.0" encoding="utf-8"?>
-<p:properties xmlns:p="http://schemas.microsoft.com/office/2006/metadata/properties" xmlns:xsi="http://www.w3.org/2001/XMLSchema-instance" xmlns:pc="http://schemas.microsoft.com/office/infopath/2007/PartnerControls">
-  <documentManagement/>
-</p:properties>
 </file>
 
 <file path=customXml/item3.xml><?xml version="1.0" encoding="utf-8"?>
@@ -18242,14 +19555,6 @@
 </file>
 
 <file path=customXml/itemProps1.xml><?xml version="1.0" encoding="utf-8"?>
-<ds:datastoreItem xmlns:ds="http://schemas.openxmlformats.org/officeDocument/2006/customXml" ds:itemID="{D1F7498C-F9C2-422B-BC41-0960A3F778D1}">
-  <ds:schemaRefs>
-    <ds:schemaRef ds:uri="http://schemas.microsoft.com/sharepoint/v3/contenttype/forms"/>
-  </ds:schemaRefs>
-</ds:datastoreItem>
-</file>
-
-<file path=customXml/itemProps2.xml><?xml version="1.0" encoding="utf-8"?>
 <ds:datastoreItem xmlns:ds="http://schemas.openxmlformats.org/officeDocument/2006/customXml" ds:itemID="{99174808-9C2B-4902-8C9D-44348A1FD8BB}">
   <ds:schemaRefs>
     <ds:schemaRef ds:uri="http://purl.org/dc/dcmitype/"/>
@@ -18260,6 +19565,14 @@
     <ds:schemaRef ds:uri="http://purl.org/dc/elements/1.1/"/>
     <ds:schemaRef ds:uri="http://schemas.openxmlformats.org/package/2006/metadata/core-properties"/>
     <ds:schemaRef ds:uri="http://schemas.microsoft.com/office/infopath/2007/PartnerControls"/>
+  </ds:schemaRefs>
+</ds:datastoreItem>
+</file>
+
+<file path=customXml/itemProps2.xml><?xml version="1.0" encoding="utf-8"?>
+<ds:datastoreItem xmlns:ds="http://schemas.openxmlformats.org/officeDocument/2006/customXml" ds:itemID="{D1F7498C-F9C2-422B-BC41-0960A3F778D1}">
+  <ds:schemaRefs>
+    <ds:schemaRef ds:uri="http://schemas.microsoft.com/sharepoint/v3/contenttype/forms"/>
   </ds:schemaRefs>
 </ds:datastoreItem>
 </file>

</xml_diff>

<commit_message>
Removed main - updated ppt
</commit_message>
<xml_diff>
--- a/Bootcamp_2013_Javascript.pptx
+++ b/Bootcamp_2013_Javascript.pptx
@@ -244,7 +244,7 @@
             <a:fld id="{EE6C105D-2CF9-41DB-85FD-D66740423677}" type="datetimeFigureOut">
               <a:rPr lang="nl-BE" smtClean="0"/>
               <a:pPr/>
-              <a:t>2/06/2013</a:t>
+              <a:t>3/06/2013</a:t>
             </a:fld>
             <a:endParaRPr lang="nl-BE"/>
           </a:p>
@@ -411,7 +411,7 @@
             <a:fld id="{EB0EBD4C-DAF9-4E72-A1A4-1160C8AA0ED9}" type="datetimeFigureOut">
               <a:rPr lang="nl-BE" smtClean="0"/>
               <a:pPr/>
-              <a:t>2/06/2013</a:t>
+              <a:t>3/06/2013</a:t>
             </a:fld>
             <a:endParaRPr lang="nl-BE"/>
           </a:p>
@@ -17969,8 +17969,17 @@
             <a:pPr lvl="1"/>
             <a:r>
               <a:rPr lang="en-US" dirty="0" smtClean="0"/>
-              <a:t>Most proxies ignore these on file request</a:t>
-            </a:r>
+              <a:t>Proxies can be configured to ignore </a:t>
+            </a:r>
+            <a:r>
+              <a:rPr lang="en-US" dirty="0" err="1" smtClean="0"/>
+              <a:t>querystring</a:t>
+            </a:r>
+            <a:r>
+              <a:rPr lang="en-US" dirty="0" smtClean="0"/>
+              <a:t> on files</a:t>
+            </a:r>
+            <a:endParaRPr lang="en-US" dirty="0" smtClean="0"/>
           </a:p>
           <a:p>
             <a:pPr lvl="1"/>
@@ -19426,18 +19435,18 @@
 </file>
 
 <file path=customXml/item1.xml><?xml version="1.0" encoding="utf-8"?>
-<p:properties xmlns:p="http://schemas.microsoft.com/office/2006/metadata/properties" xmlns:xsi="http://www.w3.org/2001/XMLSchema-instance" xmlns:pc="http://schemas.microsoft.com/office/infopath/2007/PartnerControls">
-  <documentManagement/>
-</p:properties>
-</file>
-
-<file path=customXml/item2.xml><?xml version="1.0" encoding="utf-8"?>
 <?mso-contentType ?>
 <FormTemplates xmlns="http://schemas.microsoft.com/sharepoint/v3/contenttype/forms">
   <Display>DocumentLibraryForm</Display>
   <Edit>DocumentLibraryForm</Edit>
   <New>DocumentLibraryForm</New>
 </FormTemplates>
+</file>
+
+<file path=customXml/item2.xml><?xml version="1.0" encoding="utf-8"?>
+<p:properties xmlns:p="http://schemas.microsoft.com/office/2006/metadata/properties" xmlns:xsi="http://www.w3.org/2001/XMLSchema-instance" xmlns:pc="http://schemas.microsoft.com/office/infopath/2007/PartnerControls">
+  <documentManagement/>
+</p:properties>
 </file>
 
 <file path=customXml/item3.xml><?xml version="1.0" encoding="utf-8"?>
@@ -19555,6 +19564,14 @@
 </file>
 
 <file path=customXml/itemProps1.xml><?xml version="1.0" encoding="utf-8"?>
+<ds:datastoreItem xmlns:ds="http://schemas.openxmlformats.org/officeDocument/2006/customXml" ds:itemID="{D1F7498C-F9C2-422B-BC41-0960A3F778D1}">
+  <ds:schemaRefs>
+    <ds:schemaRef ds:uri="http://schemas.microsoft.com/sharepoint/v3/contenttype/forms"/>
+  </ds:schemaRefs>
+</ds:datastoreItem>
+</file>
+
+<file path=customXml/itemProps2.xml><?xml version="1.0" encoding="utf-8"?>
 <ds:datastoreItem xmlns:ds="http://schemas.openxmlformats.org/officeDocument/2006/customXml" ds:itemID="{99174808-9C2B-4902-8C9D-44348A1FD8BB}">
   <ds:schemaRefs>
     <ds:schemaRef ds:uri="http://purl.org/dc/dcmitype/"/>
@@ -19565,14 +19582,6 @@
     <ds:schemaRef ds:uri="http://purl.org/dc/elements/1.1/"/>
     <ds:schemaRef ds:uri="http://schemas.openxmlformats.org/package/2006/metadata/core-properties"/>
     <ds:schemaRef ds:uri="http://schemas.microsoft.com/office/infopath/2007/PartnerControls"/>
-  </ds:schemaRefs>
-</ds:datastoreItem>
-</file>
-
-<file path=customXml/itemProps2.xml><?xml version="1.0" encoding="utf-8"?>
-<ds:datastoreItem xmlns:ds="http://schemas.openxmlformats.org/officeDocument/2006/customXml" ds:itemID="{D1F7498C-F9C2-422B-BC41-0960A3F778D1}">
-  <ds:schemaRefs>
-    <ds:schemaRef ds:uri="http://schemas.microsoft.com/sharepoint/v3/contenttype/forms"/>
   </ds:schemaRefs>
 </ds:datastoreItem>
 </file>

</xml_diff>

<commit_message>
url rewrite stuff added
</commit_message>
<xml_diff>
--- a/Bootcamp_2013_Javascript.pptx
+++ b/Bootcamp_2013_Javascript.pptx
@@ -6131,16 +6131,13 @@
           <a:p>
             <a:r>
               <a:rPr lang="en-US" dirty="0" smtClean="0"/>
-              <a:t>Debugger;</a:t>
-            </a:r>
-          </a:p>
-          <a:p>
-            <a:pPr lvl="1"/>
+              <a:t>Debugger</a:t>
+            </a:r>
             <a:r>
               <a:rPr lang="en-US" dirty="0" smtClean="0"/>
-              <a:t>ECMA5Script</a:t>
-            </a:r>
-            <a:endParaRPr lang="nl-BE" dirty="0"/>
+              <a:t>;</a:t>
+            </a:r>
+            <a:endParaRPr lang="en-US" dirty="0" smtClean="0"/>
           </a:p>
         </p:txBody>
       </p:sp>
@@ -6339,91 +6336,6 @@
                                           <p:spTgt spid="6">
                                             <p:txEl>
                                               <p:pRg st="1" end="1"/>
-                                            </p:txEl>
-                                          </p:spTgt>
-                                        </p:tgtEl>
-                                        <p:attrNameLst>
-                                          <p:attrName>ppt_y</p:attrName>
-                                        </p:attrNameLst>
-                                      </p:cBhvr>
-                                      <p:tavLst>
-                                        <p:tav tm="0">
-                                          <p:val>
-                                            <p:strVal val="1+#ppt_h/2"/>
-                                          </p:val>
-                                        </p:tav>
-                                        <p:tav tm="100000">
-                                          <p:val>
-                                            <p:strVal val="#ppt_y"/>
-                                          </p:val>
-                                        </p:tav>
-                                      </p:tavLst>
-                                    </p:anim>
-                                  </p:childTnLst>
-                                </p:cTn>
-                              </p:par>
-                              <p:par>
-                                <p:cTn id="15" presetID="2" presetClass="entr" presetSubtype="4" fill="hold" grpId="0" nodeType="withEffect">
-                                  <p:stCondLst>
-                                    <p:cond delay="0"/>
-                                  </p:stCondLst>
-                                  <p:childTnLst>
-                                    <p:set>
-                                      <p:cBhvr>
-                                        <p:cTn id="16" dur="1" fill="hold">
-                                          <p:stCondLst>
-                                            <p:cond delay="0"/>
-                                          </p:stCondLst>
-                                        </p:cTn>
-                                        <p:tgtEl>
-                                          <p:spTgt spid="6">
-                                            <p:txEl>
-                                              <p:pRg st="2" end="2"/>
-                                            </p:txEl>
-                                          </p:spTgt>
-                                        </p:tgtEl>
-                                        <p:attrNameLst>
-                                          <p:attrName>style.visibility</p:attrName>
-                                        </p:attrNameLst>
-                                      </p:cBhvr>
-                                      <p:to>
-                                        <p:strVal val="visible"/>
-                                      </p:to>
-                                    </p:set>
-                                    <p:anim calcmode="lin" valueType="num">
-                                      <p:cBhvr additive="base">
-                                        <p:cTn id="17" dur="500" fill="hold"/>
-                                        <p:tgtEl>
-                                          <p:spTgt spid="6">
-                                            <p:txEl>
-                                              <p:pRg st="2" end="2"/>
-                                            </p:txEl>
-                                          </p:spTgt>
-                                        </p:tgtEl>
-                                        <p:attrNameLst>
-                                          <p:attrName>ppt_x</p:attrName>
-                                        </p:attrNameLst>
-                                      </p:cBhvr>
-                                      <p:tavLst>
-                                        <p:tav tm="0">
-                                          <p:val>
-                                            <p:strVal val="#ppt_x"/>
-                                          </p:val>
-                                        </p:tav>
-                                        <p:tav tm="100000">
-                                          <p:val>
-                                            <p:strVal val="#ppt_x"/>
-                                          </p:val>
-                                        </p:tav>
-                                      </p:tavLst>
-                                    </p:anim>
-                                    <p:anim calcmode="lin" valueType="num">
-                                      <p:cBhvr additive="base">
-                                        <p:cTn id="18" dur="500" fill="hold"/>
-                                        <p:tgtEl>
-                                          <p:spTgt spid="6">
-                                            <p:txEl>
-                                              <p:pRg st="2" end="2"/>
                                             </p:txEl>
                                           </p:spTgt>
                                         </p:tgtEl>

</xml_diff>